<commit_message>
corrected Address Component img
</commit_message>
<xml_diff>
--- a/images/diagrams.pptx
+++ b/images/diagrams.pptx
@@ -8116,114 +8116,6 @@
       </p:grpSpPr>
       <p:grpSp>
         <p:nvGrpSpPr>
-          <p:cNvPr id="51" name="Group 50"/>
-          <p:cNvGrpSpPr/>
-          <p:nvPr/>
-        </p:nvGrpSpPr>
-        <p:grpSpPr>
-          <a:xfrm rot="16200000">
-            <a:off x="4968899" y="3301586"/>
-            <a:ext cx="430618" cy="443512"/>
-            <a:chOff x="2398308" y="2057400"/>
-            <a:chExt cx="430618" cy="443512"/>
-          </a:xfrm>
-        </p:grpSpPr>
-        <p:cxnSp>
-          <p:nvCxnSpPr>
-            <p:cNvPr id="52" name="Elbow Connector 51"/>
-            <p:cNvCxnSpPr/>
-            <p:nvPr/>
-          </p:nvCxnSpPr>
-          <p:spPr>
-            <a:xfrm rot="16200000" flipH="1" flipV="1">
-              <a:off x="2395085" y="2060623"/>
-              <a:ext cx="221756" cy="215309"/>
-            </a:xfrm>
-            <a:prstGeom prst="bentConnector4">
-              <a:avLst>
-                <a:gd name="adj1" fmla="val -103086"/>
-                <a:gd name="adj2" fmla="val 206173"/>
-              </a:avLst>
-            </a:prstGeom>
-            <a:ln>
-              <a:solidFill>
-                <a:srgbClr val="000080"/>
-              </a:solidFill>
-              <a:headEnd type="none"/>
-              <a:tailEnd type="triangle"/>
-            </a:ln>
-          </p:spPr>
-          <p:style>
-            <a:lnRef idx="1">
-              <a:schemeClr val="accent1"/>
-            </a:lnRef>
-            <a:fillRef idx="0">
-              <a:schemeClr val="accent1"/>
-            </a:fillRef>
-            <a:effectRef idx="0">
-              <a:schemeClr val="accent1"/>
-            </a:effectRef>
-            <a:fontRef idx="minor">
-              <a:schemeClr val="tx1"/>
-            </a:fontRef>
-          </p:style>
-        </p:cxnSp>
-        <p:sp>
-          <p:nvSpPr>
-            <p:cNvPr id="53" name="Rectangle 52"/>
-            <p:cNvSpPr/>
-            <p:nvPr/>
-          </p:nvSpPr>
-          <p:spPr>
-            <a:xfrm>
-              <a:off x="2398308" y="2057400"/>
-              <a:ext cx="430618" cy="443512"/>
-            </a:xfrm>
-            <a:prstGeom prst="rect">
-              <a:avLst/>
-            </a:prstGeom>
-            <a:solidFill>
-              <a:srgbClr val="F2F3F4"/>
-            </a:solidFill>
-            <a:ln>
-              <a:noFill/>
-            </a:ln>
-          </p:spPr>
-          <p:style>
-            <a:lnRef idx="2">
-              <a:schemeClr val="accent1">
-                <a:shade val="50000"/>
-              </a:schemeClr>
-            </a:lnRef>
-            <a:fillRef idx="1">
-              <a:schemeClr val="accent1"/>
-            </a:fillRef>
-            <a:effectRef idx="0">
-              <a:schemeClr val="accent1"/>
-            </a:effectRef>
-            <a:fontRef idx="minor">
-              <a:schemeClr val="lt1"/>
-            </a:fontRef>
-          </p:style>
-          <p:txBody>
-            <a:bodyPr rtlCol="0" anchor="ctr"/>
-            <a:lstStyle/>
-            <a:p>
-              <a:pPr algn="ctr"/>
-              <a:endParaRPr lang="en-US" b="1">
-                <a:solidFill>
-                  <a:srgbClr val="005A9C"/>
-                </a:solidFill>
-                <a:latin typeface="Arial" charset="0"/>
-                <a:ea typeface="Arial" charset="0"/>
-                <a:cs typeface="Arial" charset="0"/>
-              </a:endParaRPr>
-            </a:p>
-          </p:txBody>
-        </p:sp>
-      </p:grpSp>
-      <p:grpSp>
-        <p:nvGrpSpPr>
           <p:cNvPr id="50" name="Group 49"/>
           <p:cNvGrpSpPr/>
           <p:nvPr/>
@@ -8335,64 +8227,6 @@
       </p:grpSp>
       <p:sp>
         <p:nvSpPr>
-          <p:cNvPr id="6" name="Rectangle 5"/>
-          <p:cNvSpPr/>
-          <p:nvPr/>
-        </p:nvSpPr>
-        <p:spPr>
-          <a:xfrm>
-            <a:off x="4957064" y="2565596"/>
-            <a:ext cx="1962150" cy="1181100"/>
-          </a:xfrm>
-          <a:prstGeom prst="rect">
-            <a:avLst/>
-          </a:prstGeom>
-          <a:solidFill>
-            <a:srgbClr val="F4FFFF"/>
-          </a:solidFill>
-          <a:ln>
-            <a:solidFill>
-              <a:srgbClr val="000080"/>
-            </a:solidFill>
-          </a:ln>
-        </p:spPr>
-        <p:style>
-          <a:lnRef idx="2">
-            <a:schemeClr val="accent1">
-              <a:shade val="50000"/>
-            </a:schemeClr>
-          </a:lnRef>
-          <a:fillRef idx="1">
-            <a:schemeClr val="accent1"/>
-          </a:fillRef>
-          <a:effectRef idx="0">
-            <a:schemeClr val="accent1"/>
-          </a:effectRef>
-          <a:fontRef idx="minor">
-            <a:schemeClr val="lt1"/>
-          </a:fontRef>
-        </p:style>
-        <p:txBody>
-          <a:bodyPr rtlCol="0" anchor="ctr"/>
-          <a:lstStyle/>
-          <a:p>
-            <a:pPr algn="ctr"/>
-            <a:r>
-              <a:rPr lang="en-US" b="1">
-                <a:solidFill>
-                  <a:srgbClr val="005A9C"/>
-                </a:solidFill>
-                <a:latin typeface="Arial" charset="0"/>
-                <a:ea typeface="Arial" charset="0"/>
-                <a:cs typeface="Arial" charset="0"/>
-              </a:rPr>
-              <a:t>Address Component</a:t>
-            </a:r>
-          </a:p>
-        </p:txBody>
-      </p:sp>
-      <p:sp>
-        <p:nvSpPr>
           <p:cNvPr id="11" name="Rectangle 10"/>
           <p:cNvSpPr/>
           <p:nvPr/>
@@ -9133,7 +8967,7 @@
         </p:nvSpPr>
         <p:spPr>
           <a:xfrm>
-            <a:off x="2413965" y="3886437"/>
+            <a:off x="2380140" y="3699273"/>
             <a:ext cx="2405467" cy="369332"/>
           </a:xfrm>
           <a:prstGeom prst="rect">
@@ -9369,6 +9203,348 @@
             <a:r>
               <a:rPr lang="en-US"/>
               <a:t>value information [1..*]</a:t>
+            </a:r>
+          </a:p>
+        </p:txBody>
+      </p:sp>
+      <p:sp>
+        <p:nvSpPr>
+          <p:cNvPr id="32" name="Rectangle 31"/>
+          <p:cNvSpPr/>
+          <p:nvPr/>
+        </p:nvSpPr>
+        <p:spPr>
+          <a:xfrm>
+            <a:off x="1859771" y="4886778"/>
+            <a:ext cx="1962150" cy="1181100"/>
+          </a:xfrm>
+          <a:prstGeom prst="rect">
+            <a:avLst/>
+          </a:prstGeom>
+          <a:solidFill>
+            <a:schemeClr val="bg1"/>
+          </a:solidFill>
+          <a:ln>
+            <a:solidFill>
+              <a:srgbClr val="000080"/>
+            </a:solidFill>
+          </a:ln>
+        </p:spPr>
+        <p:style>
+          <a:lnRef idx="2">
+            <a:schemeClr val="accent1">
+              <a:shade val="50000"/>
+            </a:schemeClr>
+          </a:lnRef>
+          <a:fillRef idx="1">
+            <a:schemeClr val="accent1"/>
+          </a:fillRef>
+          <a:effectRef idx="0">
+            <a:schemeClr val="accent1"/>
+          </a:effectRef>
+          <a:fontRef idx="minor">
+            <a:schemeClr val="lt1"/>
+          </a:fontRef>
+        </p:style>
+        <p:txBody>
+          <a:bodyPr rtlCol="0" anchor="ctr"/>
+          <a:lstStyle/>
+          <a:p>
+            <a:pPr algn="ctr"/>
+            <a:r>
+              <a:rPr lang="en-US" b="1">
+                <a:solidFill>
+                  <a:srgbClr val="005A9C"/>
+                </a:solidFill>
+                <a:latin typeface="Arial" charset="0"/>
+                <a:ea typeface="Arial" charset="0"/>
+                <a:cs typeface="Arial" charset="0"/>
+              </a:rPr>
+              <a:t>iso19135: RE_Locale</a:t>
+            </a:r>
+          </a:p>
+        </p:txBody>
+      </p:sp>
+      <p:cxnSp>
+        <p:nvCxnSpPr>
+          <p:cNvPr id="35" name="Straight Arrow Connector 34"/>
+          <p:cNvCxnSpPr/>
+          <p:nvPr/>
+        </p:nvCxnSpPr>
+        <p:spPr>
+          <a:xfrm flipH="1">
+            <a:off x="3831337" y="3742963"/>
+            <a:ext cx="1125598" cy="1143815"/>
+          </a:xfrm>
+          <a:prstGeom prst="straightConnector1">
+            <a:avLst/>
+          </a:prstGeom>
+          <a:ln>
+            <a:solidFill>
+              <a:srgbClr val="000080"/>
+            </a:solidFill>
+            <a:tailEnd type="triangle"/>
+          </a:ln>
+        </p:spPr>
+        <p:style>
+          <a:lnRef idx="1">
+            <a:schemeClr val="accent1"/>
+          </a:lnRef>
+          <a:fillRef idx="0">
+            <a:schemeClr val="accent1"/>
+          </a:fillRef>
+          <a:effectRef idx="0">
+            <a:schemeClr val="accent1"/>
+          </a:effectRef>
+          <a:fontRef idx="minor">
+            <a:schemeClr val="tx1"/>
+          </a:fontRef>
+        </p:style>
+      </p:cxnSp>
+      <p:sp>
+        <p:nvSpPr>
+          <p:cNvPr id="36" name="TextBox 35"/>
+          <p:cNvSpPr txBox="1"/>
+          <p:nvPr/>
+        </p:nvSpPr>
+        <p:spPr>
+          <a:xfrm>
+            <a:off x="3472234" y="4421232"/>
+            <a:ext cx="1277658" cy="369332"/>
+          </a:xfrm>
+          <a:prstGeom prst="rect">
+            <a:avLst/>
+          </a:prstGeom>
+          <a:solidFill>
+            <a:srgbClr val="F2F3F4"/>
+          </a:solidFill>
+        </p:spPr>
+        <p:txBody>
+          <a:bodyPr wrap="none" rtlCol="0">
+            <a:spAutoFit/>
+          </a:bodyPr>
+          <a:lstStyle/>
+          <a:p>
+            <a:pPr algn="ctr"/>
+            <a:r>
+              <a:rPr lang="en-US"/>
+              <a:t>l</a:t>
+            </a:r>
+            <a:r>
+              <a:rPr lang="en-US"/>
+              <a:t>ocale [0..1]</a:t>
+            </a:r>
+          </a:p>
+        </p:txBody>
+      </p:sp>
+      <p:sp>
+        <p:nvSpPr>
+          <p:cNvPr id="38" name="Rectangle 37"/>
+          <p:cNvSpPr/>
+          <p:nvPr/>
+        </p:nvSpPr>
+        <p:spPr>
+          <a:xfrm>
+            <a:off x="4671702" y="3878005"/>
+            <a:ext cx="164873" cy="140903"/>
+          </a:xfrm>
+          <a:prstGeom prst="rect">
+            <a:avLst/>
+          </a:prstGeom>
+          <a:solidFill>
+            <a:srgbClr val="F2F3F4"/>
+          </a:solidFill>
+          <a:ln>
+            <a:noFill/>
+          </a:ln>
+        </p:spPr>
+        <p:style>
+          <a:lnRef idx="2">
+            <a:schemeClr val="accent1">
+              <a:shade val="50000"/>
+            </a:schemeClr>
+          </a:lnRef>
+          <a:fillRef idx="1">
+            <a:schemeClr val="accent1"/>
+          </a:fillRef>
+          <a:effectRef idx="0">
+            <a:schemeClr val="accent1"/>
+          </a:effectRef>
+          <a:fontRef idx="minor">
+            <a:schemeClr val="lt1"/>
+          </a:fontRef>
+        </p:style>
+        <p:txBody>
+          <a:bodyPr rtlCol="0" anchor="ctr"/>
+          <a:lstStyle/>
+          <a:p>
+            <a:pPr algn="ctr"/>
+            <a:endParaRPr lang="en-US"/>
+          </a:p>
+        </p:txBody>
+      </p:sp>
+      <p:grpSp>
+        <p:nvGrpSpPr>
+          <p:cNvPr id="51" name="Group 50"/>
+          <p:cNvGrpSpPr/>
+          <p:nvPr/>
+        </p:nvGrpSpPr>
+        <p:grpSpPr>
+          <a:xfrm rot="16200000">
+            <a:off x="4968899" y="3301586"/>
+            <a:ext cx="430618" cy="443512"/>
+            <a:chOff x="2398308" y="2057400"/>
+            <a:chExt cx="430618" cy="443512"/>
+          </a:xfrm>
+        </p:grpSpPr>
+        <p:sp>
+          <p:nvSpPr>
+            <p:cNvPr id="53" name="Rectangle 52"/>
+            <p:cNvSpPr/>
+            <p:nvPr/>
+          </p:nvSpPr>
+          <p:spPr>
+            <a:xfrm>
+              <a:off x="2398308" y="2057400"/>
+              <a:ext cx="430618" cy="443512"/>
+            </a:xfrm>
+            <a:prstGeom prst="rect">
+              <a:avLst/>
+            </a:prstGeom>
+            <a:solidFill>
+              <a:srgbClr val="F2F3F4"/>
+            </a:solidFill>
+            <a:ln>
+              <a:noFill/>
+            </a:ln>
+          </p:spPr>
+          <p:style>
+            <a:lnRef idx="2">
+              <a:schemeClr val="accent1">
+                <a:shade val="50000"/>
+              </a:schemeClr>
+            </a:lnRef>
+            <a:fillRef idx="1">
+              <a:schemeClr val="accent1"/>
+            </a:fillRef>
+            <a:effectRef idx="0">
+              <a:schemeClr val="accent1"/>
+            </a:effectRef>
+            <a:fontRef idx="minor">
+              <a:schemeClr val="lt1"/>
+            </a:fontRef>
+          </p:style>
+          <p:txBody>
+            <a:bodyPr rtlCol="0" anchor="ctr"/>
+            <a:lstStyle/>
+            <a:p>
+              <a:pPr algn="ctr"/>
+              <a:endParaRPr lang="en-US" b="1">
+                <a:solidFill>
+                  <a:srgbClr val="005A9C"/>
+                </a:solidFill>
+                <a:latin typeface="Arial" charset="0"/>
+                <a:ea typeface="Arial" charset="0"/>
+                <a:cs typeface="Arial" charset="0"/>
+              </a:endParaRPr>
+            </a:p>
+          </p:txBody>
+        </p:sp>
+        <p:cxnSp>
+          <p:nvCxnSpPr>
+            <p:cNvPr id="52" name="Elbow Connector 51"/>
+            <p:cNvCxnSpPr/>
+            <p:nvPr/>
+          </p:nvCxnSpPr>
+          <p:spPr>
+            <a:xfrm rot="16200000" flipH="1" flipV="1">
+              <a:off x="2395085" y="2060623"/>
+              <a:ext cx="221756" cy="215309"/>
+            </a:xfrm>
+            <a:prstGeom prst="bentConnector4">
+              <a:avLst>
+                <a:gd name="adj1" fmla="val -103086"/>
+                <a:gd name="adj2" fmla="val 206173"/>
+              </a:avLst>
+            </a:prstGeom>
+            <a:ln>
+              <a:solidFill>
+                <a:srgbClr val="000080"/>
+              </a:solidFill>
+              <a:headEnd type="none"/>
+              <a:tailEnd type="triangle"/>
+            </a:ln>
+          </p:spPr>
+          <p:style>
+            <a:lnRef idx="1">
+              <a:schemeClr val="accent1"/>
+            </a:lnRef>
+            <a:fillRef idx="0">
+              <a:schemeClr val="accent1"/>
+            </a:fillRef>
+            <a:effectRef idx="0">
+              <a:schemeClr val="accent1"/>
+            </a:effectRef>
+            <a:fontRef idx="minor">
+              <a:schemeClr val="tx1"/>
+            </a:fontRef>
+          </p:style>
+        </p:cxnSp>
+      </p:grpSp>
+      <p:sp>
+        <p:nvSpPr>
+          <p:cNvPr id="6" name="Rectangle 5"/>
+          <p:cNvSpPr/>
+          <p:nvPr/>
+        </p:nvSpPr>
+        <p:spPr>
+          <a:xfrm>
+            <a:off x="4957064" y="2565596"/>
+            <a:ext cx="1962150" cy="1181100"/>
+          </a:xfrm>
+          <a:prstGeom prst="rect">
+            <a:avLst/>
+          </a:prstGeom>
+          <a:solidFill>
+            <a:srgbClr val="F4FFFF"/>
+          </a:solidFill>
+          <a:ln>
+            <a:solidFill>
+              <a:srgbClr val="000080"/>
+            </a:solidFill>
+          </a:ln>
+        </p:spPr>
+        <p:style>
+          <a:lnRef idx="2">
+            <a:schemeClr val="accent1">
+              <a:shade val="50000"/>
+            </a:schemeClr>
+          </a:lnRef>
+          <a:fillRef idx="1">
+            <a:schemeClr val="accent1"/>
+          </a:fillRef>
+          <a:effectRef idx="0">
+            <a:schemeClr val="accent1"/>
+          </a:effectRef>
+          <a:fontRef idx="minor">
+            <a:schemeClr val="lt1"/>
+          </a:fontRef>
+        </p:style>
+        <p:txBody>
+          <a:bodyPr rtlCol="0" anchor="ctr"/>
+          <a:lstStyle/>
+          <a:p>
+            <a:pPr algn="ctr"/>
+            <a:r>
+              <a:rPr lang="en-US" b="1">
+                <a:solidFill>
+                  <a:srgbClr val="005A9C"/>
+                </a:solidFill>
+                <a:latin typeface="Arial" charset="0"/>
+                <a:ea typeface="Arial" charset="0"/>
+                <a:cs typeface="Arial" charset="0"/>
+              </a:rPr>
+              <a:t>Address Component</a:t>
             </a:r>
           </a:p>
         </p:txBody>

</xml_diff>